<commit_message>
Minor improvements in doc
</commit_message>
<xml_diff>
--- a/Pure-HTTP-Transport-for-MCP.pptx
+++ b/Pure-HTTP-Transport-for-MCP.pptx
@@ -2112,7 +2112,7 @@
           <a:p>
             <a:fld id="{2785F22C-E804-9841-8C0B-EA1D5F46B8A1}" type="datetimeFigureOut">
               <a:rPr lang="en-US" smtClean="0"/>
-              <a:t>9/27/25</a:t>
+              <a:t>9/30/25</a:t>
             </a:fld>
             <a:endParaRPr lang="en-US"/>
           </a:p>
@@ -2280,7 +2280,7 @@
           <a:p>
             <a:fld id="{2785F22C-E804-9841-8C0B-EA1D5F46B8A1}" type="datetimeFigureOut">
               <a:rPr lang="en-US" smtClean="0"/>
-              <a:t>9/27/25</a:t>
+              <a:t>9/30/25</a:t>
             </a:fld>
             <a:endParaRPr lang="en-US"/>
           </a:p>
@@ -2458,7 +2458,7 @@
           <a:p>
             <a:fld id="{2785F22C-E804-9841-8C0B-EA1D5F46B8A1}" type="datetimeFigureOut">
               <a:rPr lang="en-US" smtClean="0"/>
-              <a:t>9/27/25</a:t>
+              <a:t>9/30/25</a:t>
             </a:fld>
             <a:endParaRPr lang="en-US"/>
           </a:p>
@@ -2626,7 +2626,7 @@
           <a:p>
             <a:fld id="{2785F22C-E804-9841-8C0B-EA1D5F46B8A1}" type="datetimeFigureOut">
               <a:rPr lang="en-US" smtClean="0"/>
-              <a:t>9/27/25</a:t>
+              <a:t>9/30/25</a:t>
             </a:fld>
             <a:endParaRPr lang="en-US"/>
           </a:p>
@@ -2871,7 +2871,7 @@
           <a:p>
             <a:fld id="{2785F22C-E804-9841-8C0B-EA1D5F46B8A1}" type="datetimeFigureOut">
               <a:rPr lang="en-US" smtClean="0"/>
-              <a:t>9/27/25</a:t>
+              <a:t>9/30/25</a:t>
             </a:fld>
             <a:endParaRPr lang="en-US"/>
           </a:p>
@@ -3100,7 +3100,7 @@
           <a:p>
             <a:fld id="{2785F22C-E804-9841-8C0B-EA1D5F46B8A1}" type="datetimeFigureOut">
               <a:rPr lang="en-US" smtClean="0"/>
-              <a:t>9/27/25</a:t>
+              <a:t>9/30/25</a:t>
             </a:fld>
             <a:endParaRPr lang="en-US"/>
           </a:p>
@@ -3464,7 +3464,7 @@
           <a:p>
             <a:fld id="{2785F22C-E804-9841-8C0B-EA1D5F46B8A1}" type="datetimeFigureOut">
               <a:rPr lang="en-US" smtClean="0"/>
-              <a:t>9/27/25</a:t>
+              <a:t>9/30/25</a:t>
             </a:fld>
             <a:endParaRPr lang="en-US"/>
           </a:p>
@@ -3581,7 +3581,7 @@
           <a:p>
             <a:fld id="{2785F22C-E804-9841-8C0B-EA1D5F46B8A1}" type="datetimeFigureOut">
               <a:rPr lang="en-US" smtClean="0"/>
-              <a:t>9/27/25</a:t>
+              <a:t>9/30/25</a:t>
             </a:fld>
             <a:endParaRPr lang="en-US"/>
           </a:p>
@@ -3676,7 +3676,7 @@
           <a:p>
             <a:fld id="{2785F22C-E804-9841-8C0B-EA1D5F46B8A1}" type="datetimeFigureOut">
               <a:rPr lang="en-US" smtClean="0"/>
-              <a:t>9/27/25</a:t>
+              <a:t>9/30/25</a:t>
             </a:fld>
             <a:endParaRPr lang="en-US"/>
           </a:p>
@@ -3951,7 +3951,7 @@
           <a:p>
             <a:fld id="{2785F22C-E804-9841-8C0B-EA1D5F46B8A1}" type="datetimeFigureOut">
               <a:rPr lang="en-US" smtClean="0"/>
-              <a:t>9/27/25</a:t>
+              <a:t>9/30/25</a:t>
             </a:fld>
             <a:endParaRPr lang="en-US"/>
           </a:p>
@@ -4206,7 +4206,7 @@
           <a:p>
             <a:fld id="{2785F22C-E804-9841-8C0B-EA1D5F46B8A1}" type="datetimeFigureOut">
               <a:rPr lang="en-US" smtClean="0"/>
-              <a:t>9/27/25</a:t>
+              <a:t>9/30/25</a:t>
             </a:fld>
             <a:endParaRPr lang="en-US"/>
           </a:p>
@@ -4417,7 +4417,7 @@
           <a:p>
             <a:fld id="{2785F22C-E804-9841-8C0B-EA1D5F46B8A1}" type="datetimeFigureOut">
               <a:rPr lang="en-US" smtClean="0"/>
-              <a:t>9/27/25</a:t>
+              <a:t>9/30/25</a:t>
             </a:fld>
             <a:endParaRPr lang="en-US"/>
           </a:p>
@@ -8580,46 +8580,75 @@
             </a:r>
           </a:p>
           <a:p>
-            <a:pPr lvl="1"/>
+            <a:pPr lvl="1">
+              <a:spcBef>
+                <a:spcPts val="1100"/>
+              </a:spcBef>
+            </a:pPr>
             <a:r>
               <a:rPr lang="en-US" dirty="0"/>
               <a:t>Efficient scaling for enterprise cloud-based MCP clients/servers. </a:t>
             </a:r>
           </a:p>
           <a:p>
-            <a:pPr lvl="1"/>
+            <a:pPr lvl="1">
+              <a:spcBef>
+                <a:spcPts val="1100"/>
+              </a:spcBef>
+            </a:pPr>
             <a:r>
               <a:rPr lang="en-US" dirty="0"/>
               <a:t>Standard HTTP mechanisms for idempotency and fault tolerance</a:t>
             </a:r>
           </a:p>
           <a:p>
-            <a:pPr lvl="1"/>
+            <a:pPr lvl="1">
+              <a:spcBef>
+                <a:spcPts val="1100"/>
+              </a:spcBef>
+            </a:pPr>
             <a:r>
               <a:rPr lang="en-US" dirty="0"/>
-              <a:t>Use of standard conditional request headers for efficient caching and optimistic concurrency</a:t>
-            </a:r>
-          </a:p>
-          <a:p>
-            <a:pPr lvl="1"/>
+              <a:t>Use of standard conditional request headers for efficient caching</a:t>
+            </a:r>
+          </a:p>
+          <a:p>
+            <a:pPr lvl="1">
+              <a:spcBef>
+                <a:spcPts val="1100"/>
+              </a:spcBef>
+            </a:pPr>
             <a:r>
               <a:rPr lang="en-US" dirty="0"/>
               <a:t>Use of standard HTTP clients available in all languages</a:t>
             </a:r>
           </a:p>
           <a:p>
-            <a:pPr lvl="1"/>
+            <a:pPr lvl="1">
+              <a:spcBef>
+                <a:spcPts val="1100"/>
+              </a:spcBef>
+            </a:pPr>
             <a:r>
               <a:rPr lang="en-US" dirty="0"/>
               <a:t>Use of standard HTTP middleware for firewalls, routing, metrics collection</a:t>
             </a:r>
           </a:p>
           <a:p>
-            <a:pPr lvl="1"/>
+            <a:pPr lvl="1">
+              <a:spcBef>
+                <a:spcPts val="1100"/>
+              </a:spcBef>
+            </a:pPr>
             <a:r>
               <a:rPr lang="en-US" dirty="0"/>
-              <a:t>Natural support for binary content</a:t>
-            </a:r>
+              <a:t>Improved observability from moving message features to the method / URL </a:t>
+            </a:r>
+            <a:r>
+              <a:rPr lang="en-US"/>
+              <a:t>/ headers</a:t>
+            </a:r>
+            <a:endParaRPr lang="en-US" dirty="0"/>
           </a:p>
         </p:txBody>
       </p:sp>
@@ -10114,14 +10143,14 @@
           <a:p>
             <a:r>
               <a:rPr lang="en-US" dirty="0"/>
-              <a:t>“_meta” sent in request/response bodies (except for GETs)</a:t>
+              <a:t>"_meta" sent in request/response bodies (except for GETs)</a:t>
             </a:r>
           </a:p>
           <a:p>
             <a:pPr lvl="1"/>
             <a:r>
               <a:rPr lang="en-US" dirty="0"/>
-              <a:t>In MCP, “_meta” is in “params” of requests and top-level property of responses.</a:t>
+              <a:t>In MCP, "_meta" is in "params" of requests and top-level property of responses.</a:t>
             </a:r>
           </a:p>
         </p:txBody>

</xml_diff>

<commit_message>
Update docs for read/get changing to GET method
</commit_message>
<xml_diff>
--- a/Pure-HTTP-Transport-for-MCP.pptx
+++ b/Pure-HTTP-Transport-for-MCP.pptx
@@ -10092,7 +10092,14 @@
           <a:p>
             <a:r>
               <a:rPr lang="en-US" dirty="0"/>
-              <a:t>Get requests -&gt; HTTP POST</a:t>
+              <a:t>Get requests -&gt; HTTP GET</a:t>
+            </a:r>
+          </a:p>
+          <a:p>
+            <a:pPr lvl="1"/>
+            <a:r>
+              <a:rPr lang="en-US" dirty="0"/>
+              <a:t>Parameters and _meta sent in headers</a:t>
             </a:r>
           </a:p>
           <a:p>
@@ -12353,7 +12360,7 @@
                 <a:latin typeface="Courier New" panose="02070309020205020404" pitchFamily="49" charset="0"/>
                 <a:cs typeface="Courier New" panose="02070309020205020404" pitchFamily="49" charset="0"/>
               </a:rPr>
-              <a:t>  "method": ”</a:t>
+              <a:t>  "method": "</a:t>
             </a:r>
             <a:r>
               <a:rPr lang="en-US" sz="1400" dirty="0" err="1">
@@ -12408,16 +12415,16 @@
                 <a:latin typeface="Courier New" panose="02070309020205020404" pitchFamily="49" charset="0"/>
                 <a:cs typeface="Courier New" panose="02070309020205020404" pitchFamily="49" charset="0"/>
               </a:rPr>
-              <a:t>": "abc123”,</a:t>
-            </a:r>
-          </a:p>
-          <a:p>
-            <a:r>
-              <a:rPr lang="en-US" sz="1400" dirty="0">
-                <a:latin typeface="Courier New" panose="02070309020205020404" pitchFamily="49" charset="0"/>
-                <a:cs typeface="Courier New" panose="02070309020205020404" pitchFamily="49" charset="0"/>
-              </a:rPr>
-              <a:t>      ”custom”: ”42”</a:t>
+              <a:t>": "abc123",</a:t>
+            </a:r>
+          </a:p>
+          <a:p>
+            <a:r>
+              <a:rPr lang="en-US" sz="1400" dirty="0">
+                <a:latin typeface="Courier New" panose="02070309020205020404" pitchFamily="49" charset="0"/>
+                <a:cs typeface="Courier New" panose="02070309020205020404" pitchFamily="49" charset="0"/>
+              </a:rPr>
+              <a:t>      "custom": "42"</a:t>
             </a:r>
           </a:p>
           <a:p>
@@ -12435,7 +12442,7 @@
                 <a:latin typeface="Courier New" panose="02070309020205020404" pitchFamily="49" charset="0"/>
                 <a:cs typeface="Courier New" panose="02070309020205020404" pitchFamily="49" charset="0"/>
               </a:rPr>
-              <a:t>    ”name": "</a:t>
+              <a:t>    "name": "</a:t>
             </a:r>
             <a:r>
               <a:rPr lang="en-US" sz="1400" dirty="0" err="1">
@@ -12449,7 +12456,7 @@
                 <a:latin typeface="Courier New" panose="02070309020205020404" pitchFamily="49" charset="0"/>
                 <a:cs typeface="Courier New" panose="02070309020205020404" pitchFamily="49" charset="0"/>
               </a:rPr>
-              <a:t>”,</a:t>
+              <a:t>",</a:t>
             </a:r>
           </a:p>
           <a:p>
@@ -12584,7 +12591,7 @@
         <p:spPr>
           <a:xfrm>
             <a:off x="6096000" y="3019917"/>
-            <a:ext cx="5769528" cy="3754874"/>
+            <a:ext cx="6091732" cy="1600438"/>
           </a:xfrm>
           <a:prstGeom prst="rect">
             <a:avLst/>
@@ -12602,7 +12609,7 @@
                 <a:latin typeface="Courier New" panose="02070309020205020404" pitchFamily="49" charset="0"/>
                 <a:cs typeface="Courier New" panose="02070309020205020404" pitchFamily="49" charset="0"/>
               </a:rPr>
-              <a:t>POST /prompts/</a:t>
+              <a:t>GET /prompts/</a:t>
             </a:r>
             <a:r>
               <a:rPr lang="en-US" sz="1400" dirty="0" err="1">
@@ -12692,134 +12699,50 @@
             </a:r>
           </a:p>
           <a:p>
-            <a:endParaRPr lang="en-US" sz="1400" dirty="0">
-              <a:latin typeface="Courier New" panose="02070309020205020404" pitchFamily="49" charset="0"/>
-              <a:cs typeface="Courier New" panose="02070309020205020404" pitchFamily="49" charset="0"/>
-            </a:endParaRPr>
-          </a:p>
-          <a:p>
-            <a:r>
-              <a:rPr lang="en-US" sz="1400" dirty="0">
-                <a:latin typeface="Courier New" panose="02070309020205020404" pitchFamily="49" charset="0"/>
-                <a:cs typeface="Courier New" panose="02070309020205020404" pitchFamily="49" charset="0"/>
-              </a:rPr>
-              <a:t>{</a:t>
-            </a:r>
-          </a:p>
-          <a:p>
-            <a:r>
-              <a:rPr lang="en-US" sz="1400" dirty="0">
-                <a:latin typeface="Courier New" panose="02070309020205020404" pitchFamily="49" charset="0"/>
-                <a:cs typeface="Courier New" panose="02070309020205020404" pitchFamily="49" charset="0"/>
-              </a:rPr>
-              <a:t>  "_meta": {</a:t>
-            </a:r>
-          </a:p>
-          <a:p>
-            <a:r>
-              <a:rPr lang="en-US" sz="1400" dirty="0">
-                <a:latin typeface="Courier New" panose="02070309020205020404" pitchFamily="49" charset="0"/>
-                <a:cs typeface="Courier New" panose="02070309020205020404" pitchFamily="49" charset="0"/>
-              </a:rPr>
-              <a:t>    "</a:t>
-            </a:r>
             <a:r>
               <a:rPr lang="en-US" sz="1400" dirty="0" err="1">
                 <a:latin typeface="Courier New" panose="02070309020205020404" pitchFamily="49" charset="0"/>
                 <a:cs typeface="Courier New" panose="02070309020205020404" pitchFamily="49" charset="0"/>
               </a:rPr>
-              <a:t>progressToken</a:t>
-            </a:r>
-            <a:r>
-              <a:rPr lang="en-US" sz="1400" dirty="0">
-                <a:latin typeface="Courier New" panose="02070309020205020404" pitchFamily="49" charset="0"/>
-                <a:cs typeface="Courier New" panose="02070309020205020404" pitchFamily="49" charset="0"/>
-              </a:rPr>
-              <a:t>": "abc123”,</a:t>
-            </a:r>
-          </a:p>
-          <a:p>
-            <a:r>
-              <a:rPr lang="en-US" sz="1400" dirty="0">
-                <a:latin typeface="Courier New" panose="02070309020205020404" pitchFamily="49" charset="0"/>
-                <a:cs typeface="Courier New" panose="02070309020205020404" pitchFamily="49" charset="0"/>
-              </a:rPr>
-              <a:t>    ”custom”: ”42”</a:t>
-            </a:r>
-          </a:p>
-          <a:p>
-            <a:r>
-              <a:rPr lang="en-US" sz="1400" dirty="0">
-                <a:latin typeface="Courier New" panose="02070309020205020404" pitchFamily="49" charset="0"/>
-                <a:cs typeface="Courier New" panose="02070309020205020404" pitchFamily="49" charset="0"/>
-              </a:rPr>
-              <a:t>    },</a:t>
-            </a:r>
-          </a:p>
-          <a:p>
-            <a:r>
-              <a:rPr lang="en-US" sz="1400" dirty="0">
-                <a:latin typeface="Courier New" panose="02070309020205020404" pitchFamily="49" charset="0"/>
-                <a:cs typeface="Courier New" panose="02070309020205020404" pitchFamily="49" charset="0"/>
-              </a:rPr>
-              <a:t>    ”name": "</a:t>
-            </a:r>
+              <a:t>Mcp</a:t>
+            </a:r>
+            <a:r>
+              <a:rPr lang="en-US" sz="1400" dirty="0">
+                <a:latin typeface="Courier New" panose="02070309020205020404" pitchFamily="49" charset="0"/>
+                <a:cs typeface="Courier New" panose="02070309020205020404" pitchFamily="49" charset="0"/>
+              </a:rPr>
+              <a:t>-Meta: {"progressToken":"abc123","custom":"42"}</a:t>
+            </a:r>
+          </a:p>
+          <a:p>
             <a:r>
               <a:rPr lang="en-US" sz="1400" dirty="0" err="1">
                 <a:latin typeface="Courier New" panose="02070309020205020404" pitchFamily="49" charset="0"/>
                 <a:cs typeface="Courier New" panose="02070309020205020404" pitchFamily="49" charset="0"/>
               </a:rPr>
-              <a:t>code_review</a:t>
-            </a:r>
-            <a:r>
-              <a:rPr lang="en-US" sz="1400" dirty="0">
-                <a:latin typeface="Courier New" panose="02070309020205020404" pitchFamily="49" charset="0"/>
-                <a:cs typeface="Courier New" panose="02070309020205020404" pitchFamily="49" charset="0"/>
-              </a:rPr>
-              <a:t>”,</a:t>
-            </a:r>
-          </a:p>
-          <a:p>
-            <a:r>
-              <a:rPr lang="en-US" sz="1400" dirty="0">
-                <a:latin typeface="Courier New" panose="02070309020205020404" pitchFamily="49" charset="0"/>
-                <a:cs typeface="Courier New" panose="02070309020205020404" pitchFamily="49" charset="0"/>
-              </a:rPr>
-              <a:t>    "arguments": {</a:t>
-            </a:r>
-          </a:p>
-          <a:p>
-            <a:r>
-              <a:rPr lang="en-US" sz="1400" dirty="0">
-                <a:latin typeface="Courier New" panose="02070309020205020404" pitchFamily="49" charset="0"/>
-                <a:cs typeface="Courier New" panose="02070309020205020404" pitchFamily="49" charset="0"/>
-              </a:rPr>
-              <a:t>      "code": "def hello():\n print('world')"</a:t>
-            </a:r>
-          </a:p>
-          <a:p>
-            <a:r>
-              <a:rPr lang="en-US" sz="1400" dirty="0">
-                <a:latin typeface="Courier New" panose="02070309020205020404" pitchFamily="49" charset="0"/>
-                <a:cs typeface="Courier New" panose="02070309020205020404" pitchFamily="49" charset="0"/>
-              </a:rPr>
-              <a:t>    }</a:t>
-            </a:r>
-          </a:p>
-          <a:p>
-            <a:r>
-              <a:rPr lang="en-US" sz="1400" dirty="0">
-                <a:latin typeface="Courier New" panose="02070309020205020404" pitchFamily="49" charset="0"/>
-                <a:cs typeface="Courier New" panose="02070309020205020404" pitchFamily="49" charset="0"/>
-              </a:rPr>
-              <a:t>  }</a:t>
-            </a:r>
-          </a:p>
-          <a:p>
-            <a:endParaRPr lang="en-US" sz="1400" dirty="0">
-              <a:latin typeface="Courier New" panose="02070309020205020404" pitchFamily="49" charset="0"/>
-              <a:cs typeface="Courier New" panose="02070309020205020404" pitchFamily="49" charset="0"/>
-            </a:endParaRPr>
+              <a:t>Mcp</a:t>
+            </a:r>
+            <a:r>
+              <a:rPr lang="en-US" sz="1400" dirty="0">
+                <a:latin typeface="Courier New" panose="02070309020205020404" pitchFamily="49" charset="0"/>
+                <a:cs typeface="Courier New" panose="02070309020205020404" pitchFamily="49" charset="0"/>
+              </a:rPr>
+              <a:t>-Arguments: {"</a:t>
+            </a:r>
+            <a:r>
+              <a:rPr lang="en-US" sz="1400" dirty="0" err="1">
+                <a:latin typeface="Courier New" panose="02070309020205020404" pitchFamily="49" charset="0"/>
+                <a:cs typeface="Courier New" panose="02070309020205020404" pitchFamily="49" charset="0"/>
+              </a:rPr>
+              <a:t>code":"def</a:t>
+            </a:r>
+            <a:r>
+              <a:rPr lang="en-US" sz="1400" dirty="0">
+                <a:latin typeface="Courier New" panose="02070309020205020404" pitchFamily="49" charset="0"/>
+                <a:cs typeface="Courier New" panose="02070309020205020404" pitchFamily="49" charset="0"/>
+              </a:rPr>
+              <a:t> hello():\n print('world')"}</a:t>
+            </a:r>
           </a:p>
         </p:txBody>
       </p:sp>
@@ -13333,8 +13256,8 @@
         </p:nvSpPr>
         <p:spPr>
           <a:xfrm>
-            <a:off x="6095999" y="4318260"/>
-            <a:ext cx="4625185" cy="2152486"/>
+            <a:off x="6095999" y="4091378"/>
+            <a:ext cx="6091732" cy="528977"/>
           </a:xfrm>
           <a:prstGeom prst="roundRect">
             <a:avLst/>
@@ -13387,9 +13310,9 @@
           <p:nvPr/>
         </p:nvCxnSpPr>
         <p:spPr>
-          <a:xfrm>
-            <a:off x="5954254" y="5390555"/>
-            <a:ext cx="141745" cy="3948"/>
+          <a:xfrm flipV="1">
+            <a:off x="5954254" y="4355867"/>
+            <a:ext cx="141745" cy="807806"/>
           </a:xfrm>
           <a:prstGeom prst="straightConnector1">
             <a:avLst/>

</xml_diff>

<commit_message>
Change to use a single header for _meta
</commit_message>
<xml_diff>
--- a/Pure-HTTP-Transport-for-MCP.pptx
+++ b/Pure-HTTP-Transport-for-MCP.pptx
@@ -4872,13 +4872,7 @@
           <a:lstStyle/>
           <a:p>
             <a:r>
-              <a:rPr lang="en-US"/>
-              <a:t>Jeffrey Richter</a:t>
-            </a:r>
-          </a:p>
-          <a:p>
-            <a:r>
-              <a:rPr lang="en-US"/>
+              <a:rPr lang="en-US" dirty="0"/>
               <a:t>Mike Kistler</a:t>
             </a:r>
           </a:p>
@@ -10363,16 +10357,16 @@
                 <a:latin typeface="Courier New" panose="02070309020205020404" pitchFamily="49" charset="0"/>
                 <a:cs typeface="Courier New" panose="02070309020205020404" pitchFamily="49" charset="0"/>
               </a:rPr>
-              <a:t>": "abc123”,</a:t>
-            </a:r>
-          </a:p>
-          <a:p>
-            <a:r>
-              <a:rPr lang="en-US" sz="1400" dirty="0">
-                <a:latin typeface="Courier New" panose="02070309020205020404" pitchFamily="49" charset="0"/>
-                <a:cs typeface="Courier New" panose="02070309020205020404" pitchFamily="49" charset="0"/>
-              </a:rPr>
-              <a:t>      ”custom”: ”42”</a:t>
+              <a:t>": "abc123",</a:t>
+            </a:r>
+          </a:p>
+          <a:p>
+            <a:r>
+              <a:rPr lang="en-US" sz="1400" dirty="0">
+                <a:latin typeface="Courier New" panose="02070309020205020404" pitchFamily="49" charset="0"/>
+                <a:cs typeface="Courier New" panose="02070309020205020404" pitchFamily="49" charset="0"/>
+              </a:rPr>
+              <a:t>      "custom": "42"</a:t>
             </a:r>
           </a:p>
           <a:p>
@@ -10498,7 +10492,7 @@
         <p:spPr>
           <a:xfrm>
             <a:off x="6096000" y="2791317"/>
-            <a:ext cx="5769528" cy="1600438"/>
+            <a:ext cx="5984331" cy="1600438"/>
           </a:xfrm>
           <a:prstGeom prst="rect">
             <a:avLst/>
@@ -10618,24 +10612,14 @@
                 <a:latin typeface="Courier New" panose="02070309020205020404" pitchFamily="49" charset="0"/>
                 <a:cs typeface="Courier New" panose="02070309020205020404" pitchFamily="49" charset="0"/>
               </a:rPr>
-              <a:t>-Meta-Progress-Token: abc123</a:t>
-            </a:r>
-          </a:p>
-          <a:p>
-            <a:r>
-              <a:rPr lang="en-US" sz="1400" dirty="0" err="1">
-                <a:latin typeface="Courier New" panose="02070309020205020404" pitchFamily="49" charset="0"/>
-                <a:cs typeface="Courier New" panose="02070309020205020404" pitchFamily="49" charset="0"/>
-              </a:rPr>
-              <a:t>Mcp</a:t>
-            </a:r>
-            <a:r>
-              <a:rPr lang="en-US" sz="1400" dirty="0">
-                <a:latin typeface="Courier New" panose="02070309020205020404" pitchFamily="49" charset="0"/>
-                <a:cs typeface="Courier New" panose="02070309020205020404" pitchFamily="49" charset="0"/>
-              </a:rPr>
-              <a:t>-Meta-custom: 42</a:t>
-            </a:r>
+              <a:t>-Meta:{"progressToken":"abc123","custom":"42"}</a:t>
+            </a:r>
+          </a:p>
+          <a:p>
+            <a:endParaRPr lang="en-US" sz="1400" dirty="0">
+              <a:latin typeface="Courier New" panose="02070309020205020404" pitchFamily="49" charset="0"/>
+              <a:cs typeface="Courier New" panose="02070309020205020404" pitchFamily="49" charset="0"/>
+            </a:endParaRPr>
           </a:p>
         </p:txBody>
       </p:sp>
@@ -10936,58 +10920,6 @@
       </p:cxnSp>
       <p:sp>
         <p:nvSpPr>
-          <p:cNvPr id="19" name="Oval 18">
-            <a:extLst>
-              <a:ext uri="{FF2B5EF4-FFF2-40B4-BE49-F238E27FC236}">
-                <a16:creationId xmlns:a16="http://schemas.microsoft.com/office/drawing/2014/main" id="{D9D61147-8096-C9B5-9463-A03D56861C9E}"/>
-              </a:ext>
-            </a:extLst>
-          </p:cNvPr>
-          <p:cNvSpPr/>
-          <p:nvPr/>
-        </p:nvSpPr>
-        <p:spPr>
-          <a:xfrm>
-            <a:off x="1768642" y="4083247"/>
-            <a:ext cx="2791667" cy="258865"/>
-          </a:xfrm>
-          <a:prstGeom prst="ellipse">
-            <a:avLst/>
-          </a:prstGeom>
-          <a:noFill/>
-          <a:ln>
-            <a:solidFill>
-              <a:srgbClr val="FF0000"/>
-            </a:solidFill>
-          </a:ln>
-        </p:spPr>
-        <p:style>
-          <a:lnRef idx="2">
-            <a:schemeClr val="accent1">
-              <a:shade val="15000"/>
-            </a:schemeClr>
-          </a:lnRef>
-          <a:fillRef idx="1">
-            <a:schemeClr val="accent1"/>
-          </a:fillRef>
-          <a:effectRef idx="0">
-            <a:schemeClr val="accent1"/>
-          </a:effectRef>
-          <a:fontRef idx="minor">
-            <a:schemeClr val="lt1"/>
-          </a:fontRef>
-        </p:style>
-        <p:txBody>
-          <a:bodyPr rtlCol="0" anchor="ctr"/>
-          <a:lstStyle/>
-          <a:p>
-            <a:pPr algn="ctr"/>
-            <a:endParaRPr lang="en-US"/>
-          </a:p>
-        </p:txBody>
-      </p:sp>
-      <p:sp>
-        <p:nvSpPr>
           <p:cNvPr id="20" name="Oval 19">
             <a:extLst>
               <a:ext uri="{FF2B5EF4-FFF2-40B4-BE49-F238E27FC236}">
@@ -11150,7 +11082,7 @@
         <p:spPr>
           <a:xfrm>
             <a:off x="5980781" y="3852593"/>
-            <a:ext cx="3668544" cy="289034"/>
+            <a:ext cx="5528732" cy="289034"/>
           </a:xfrm>
           <a:prstGeom prst="ellipse">
             <a:avLst/>
@@ -11198,162 +11130,15 @@
           </p:cNvPr>
           <p:cNvCxnSpPr>
             <a:cxnSpLocks/>
+            <a:stCxn id="18" idx="3"/>
             <a:endCxn id="24" idx="2"/>
           </p:cNvCxnSpPr>
           <p:nvPr/>
         </p:nvCxnSpPr>
         <p:spPr>
           <a:xfrm flipV="1">
-            <a:off x="4574447" y="3997110"/>
-            <a:ext cx="1406334" cy="367032"/>
-          </a:xfrm>
-          <a:prstGeom prst="straightConnector1">
-            <a:avLst/>
-          </a:prstGeom>
-          <a:ln>
-            <a:solidFill>
-              <a:srgbClr val="FF0000"/>
-            </a:solidFill>
-            <a:tailEnd type="triangle"/>
-          </a:ln>
-        </p:spPr>
-        <p:style>
-          <a:lnRef idx="2">
-            <a:schemeClr val="accent1"/>
-          </a:lnRef>
-          <a:fillRef idx="0">
-            <a:schemeClr val="accent1"/>
-          </a:fillRef>
-          <a:effectRef idx="1">
-            <a:schemeClr val="accent1"/>
-          </a:effectRef>
-          <a:fontRef idx="minor">
-            <a:schemeClr val="tx1"/>
-          </a:fontRef>
-        </p:style>
-      </p:cxnSp>
-      <p:sp>
-        <p:nvSpPr>
-          <p:cNvPr id="27" name="Oval 26">
-            <a:extLst>
-              <a:ext uri="{FF2B5EF4-FFF2-40B4-BE49-F238E27FC236}">
-                <a16:creationId xmlns:a16="http://schemas.microsoft.com/office/drawing/2014/main" id="{0F97D5B5-A810-32DA-93B8-C5488D0A97B4}"/>
-              </a:ext>
-            </a:extLst>
-          </p:cNvPr>
-          <p:cNvSpPr/>
-          <p:nvPr/>
-        </p:nvSpPr>
-        <p:spPr>
-          <a:xfrm>
-            <a:off x="1764626" y="4331903"/>
-            <a:ext cx="2791667" cy="258865"/>
-          </a:xfrm>
-          <a:prstGeom prst="ellipse">
-            <a:avLst/>
-          </a:prstGeom>
-          <a:noFill/>
-          <a:ln>
-            <a:solidFill>
-              <a:srgbClr val="FF0000"/>
-            </a:solidFill>
-          </a:ln>
-        </p:spPr>
-        <p:style>
-          <a:lnRef idx="2">
-            <a:schemeClr val="accent1">
-              <a:shade val="15000"/>
-            </a:schemeClr>
-          </a:lnRef>
-          <a:fillRef idx="1">
-            <a:schemeClr val="accent1"/>
-          </a:fillRef>
-          <a:effectRef idx="0">
-            <a:schemeClr val="accent1"/>
-          </a:effectRef>
-          <a:fontRef idx="minor">
-            <a:schemeClr val="lt1"/>
-          </a:fontRef>
-        </p:style>
-        <p:txBody>
-          <a:bodyPr rtlCol="0" anchor="ctr"/>
-          <a:lstStyle/>
-          <a:p>
-            <a:pPr algn="ctr"/>
-            <a:endParaRPr lang="en-US"/>
-          </a:p>
-        </p:txBody>
-      </p:sp>
-      <p:sp>
-        <p:nvSpPr>
-          <p:cNvPr id="29" name="Oval 28">
-            <a:extLst>
-              <a:ext uri="{FF2B5EF4-FFF2-40B4-BE49-F238E27FC236}">
-                <a16:creationId xmlns:a16="http://schemas.microsoft.com/office/drawing/2014/main" id="{88718C42-62E7-7A22-B276-03E57D1DF42E}"/>
-              </a:ext>
-            </a:extLst>
-          </p:cNvPr>
-          <p:cNvSpPr/>
-          <p:nvPr/>
-        </p:nvSpPr>
-        <p:spPr>
-          <a:xfrm>
-            <a:off x="5994918" y="4098294"/>
-            <a:ext cx="3654407" cy="289034"/>
-          </a:xfrm>
-          <a:prstGeom prst="ellipse">
-            <a:avLst/>
-          </a:prstGeom>
-          <a:noFill/>
-          <a:ln>
-            <a:solidFill>
-              <a:srgbClr val="FF0000"/>
-            </a:solidFill>
-          </a:ln>
-        </p:spPr>
-        <p:style>
-          <a:lnRef idx="2">
-            <a:schemeClr val="accent1">
-              <a:shade val="15000"/>
-            </a:schemeClr>
-          </a:lnRef>
-          <a:fillRef idx="1">
-            <a:schemeClr val="accent1"/>
-          </a:fillRef>
-          <a:effectRef idx="0">
-            <a:schemeClr val="accent1"/>
-          </a:effectRef>
-          <a:fontRef idx="minor">
-            <a:schemeClr val="lt1"/>
-          </a:fontRef>
-        </p:style>
-        <p:txBody>
-          <a:bodyPr rtlCol="0" anchor="ctr"/>
-          <a:lstStyle/>
-          <a:p>
-            <a:pPr algn="ctr"/>
-            <a:endParaRPr lang="en-US"/>
-          </a:p>
-        </p:txBody>
-      </p:sp>
-      <p:cxnSp>
-        <p:nvCxnSpPr>
-          <p:cNvPr id="30" name="Straight Arrow Connector 29">
-            <a:extLst>
-              <a:ext uri="{FF2B5EF4-FFF2-40B4-BE49-F238E27FC236}">
-                <a16:creationId xmlns:a16="http://schemas.microsoft.com/office/drawing/2014/main" id="{5857E887-EFA8-FC1F-FFDC-D1457BB14DF0}"/>
-              </a:ext>
-            </a:extLst>
-          </p:cNvPr>
-          <p:cNvCxnSpPr>
-            <a:cxnSpLocks/>
-          </p:cNvCxnSpPr>
-          <p:nvPr/>
-        </p:nvCxnSpPr>
-        <p:spPr>
-          <a:xfrm flipV="1">
-            <a:off x="4581516" y="4052874"/>
-            <a:ext cx="1406334" cy="367032"/>
+            <a:off x="4953493" y="3997110"/>
+            <a:ext cx="1027288" cy="297858"/>
           </a:xfrm>
           <a:prstGeom prst="straightConnector1">
             <a:avLst/>
@@ -11574,6 +11359,58 @@
               </a:rPr>
               <a:t>linked</a:t>
             </a:r>
+          </a:p>
+        </p:txBody>
+      </p:sp>
+      <p:sp>
+        <p:nvSpPr>
+          <p:cNvPr id="18" name="Rounded Rectangle 17">
+            <a:extLst>
+              <a:ext uri="{FF2B5EF4-FFF2-40B4-BE49-F238E27FC236}">
+                <a16:creationId xmlns:a16="http://schemas.microsoft.com/office/drawing/2014/main" id="{5AA31A31-A389-6118-702A-DC8552BD3ABF}"/>
+              </a:ext>
+            </a:extLst>
+          </p:cNvPr>
+          <p:cNvSpPr/>
+          <p:nvPr/>
+        </p:nvSpPr>
+        <p:spPr>
+          <a:xfrm>
+            <a:off x="1388646" y="3870292"/>
+            <a:ext cx="3564847" cy="849351"/>
+          </a:xfrm>
+          <a:prstGeom prst="roundRect">
+            <a:avLst/>
+          </a:prstGeom>
+          <a:noFill/>
+          <a:ln>
+            <a:solidFill>
+              <a:srgbClr val="FF0000"/>
+            </a:solidFill>
+          </a:ln>
+        </p:spPr>
+        <p:style>
+          <a:lnRef idx="2">
+            <a:schemeClr val="accent1">
+              <a:shade val="15000"/>
+            </a:schemeClr>
+          </a:lnRef>
+          <a:fillRef idx="1">
+            <a:schemeClr val="accent1"/>
+          </a:fillRef>
+          <a:effectRef idx="0">
+            <a:schemeClr val="accent1"/>
+          </a:effectRef>
+          <a:fontRef idx="minor">
+            <a:schemeClr val="lt1"/>
+          </a:fontRef>
+        </p:style>
+        <p:txBody>
+          <a:bodyPr rtlCol="0" anchor="ctr"/>
+          <a:lstStyle/>
+          <a:p>
+            <a:pPr algn="ctr"/>
+            <a:endParaRPr lang="en-US"/>
           </a:p>
         </p:txBody>
       </p:sp>
@@ -15940,7 +15777,7 @@
           <a:lstStyle/>
           <a:p>
             <a:r>
-              <a:rPr lang="en-US" sz="1400">
+              <a:rPr lang="en-US" sz="1400" dirty="0">
                 <a:latin typeface="Courier New" panose="02070309020205020404" pitchFamily="49" charset="0"/>
                 <a:cs typeface="Courier New" panose="02070309020205020404" pitchFamily="49" charset="0"/>
               </a:rPr>
@@ -15949,34 +15786,34 @@
           </a:p>
           <a:p>
             <a:r>
-              <a:rPr lang="en-US" sz="1400">
+              <a:rPr lang="en-US" sz="1400" dirty="0">
                 <a:latin typeface="Courier New" panose="02070309020205020404" pitchFamily="49" charset="0"/>
                 <a:cs typeface="Courier New" panose="02070309020205020404" pitchFamily="49" charset="0"/>
               </a:rPr>
               <a:t>Content-Type: application/</a:t>
             </a:r>
             <a:r>
-              <a:rPr lang="en-US" sz="1400" err="1">
+              <a:rPr lang="en-US" sz="1400" dirty="0" err="1">
                 <a:latin typeface="Courier New" panose="02070309020205020404" pitchFamily="49" charset="0"/>
                 <a:cs typeface="Courier New" panose="02070309020205020404" pitchFamily="49" charset="0"/>
               </a:rPr>
               <a:t>json</a:t>
             </a:r>
-            <a:endParaRPr lang="en-US" sz="1400">
+            <a:endParaRPr lang="en-US" sz="1400" dirty="0">
               <a:latin typeface="Courier New" panose="02070309020205020404" pitchFamily="49" charset="0"/>
               <a:cs typeface="Courier New" panose="02070309020205020404" pitchFamily="49" charset="0"/>
             </a:endParaRPr>
           </a:p>
           <a:p>
             <a:r>
-              <a:rPr lang="en-US" sz="1400" err="1">
+              <a:rPr lang="en-US" sz="1400" dirty="0" err="1">
                 <a:latin typeface="Courier New" panose="02070309020205020404" pitchFamily="49" charset="0"/>
                 <a:cs typeface="Courier New" panose="02070309020205020404" pitchFamily="49" charset="0"/>
               </a:rPr>
               <a:t>Etag</a:t>
             </a:r>
             <a:r>
-              <a:rPr lang="en-US" sz="1400">
+              <a:rPr lang="en-US" sz="1400" dirty="0">
                 <a:latin typeface="Courier New" panose="02070309020205020404" pitchFamily="49" charset="0"/>
                 <a:cs typeface="Courier New" panose="02070309020205020404" pitchFamily="49" charset="0"/>
               </a:rPr>
@@ -15984,14 +15821,14 @@
             </a:r>
           </a:p>
           <a:p>
-            <a:endParaRPr lang="en-US" sz="1400">
+            <a:endParaRPr lang="en-US" sz="1400" dirty="0">
               <a:latin typeface="Courier New" panose="02070309020205020404" pitchFamily="49" charset="0"/>
               <a:cs typeface="Courier New" panose="02070309020205020404" pitchFamily="49" charset="0"/>
             </a:endParaRPr>
           </a:p>
           <a:p>
             <a:r>
-              <a:rPr lang="en-US" sz="1400">
+              <a:rPr lang="en-US" sz="1400" dirty="0">
                 <a:latin typeface="Courier New" panose="02070309020205020404" pitchFamily="49" charset="0"/>
                 <a:cs typeface="Courier New" panose="02070309020205020404" pitchFamily="49" charset="0"/>
               </a:rPr>
@@ -16000,7 +15837,7 @@
           </a:p>
           <a:p>
             <a:r>
-              <a:rPr lang="en-US" sz="1400">
+              <a:rPr lang="en-US" sz="1400" dirty="0">
                 <a:latin typeface="Courier New" panose="02070309020205020404" pitchFamily="49" charset="0"/>
                 <a:cs typeface="Courier New" panose="02070309020205020404" pitchFamily="49" charset="0"/>
               </a:rPr>
@@ -16009,21 +15846,21 @@
           </a:p>
           <a:p>
             <a:r>
-              <a:rPr lang="en-US" sz="1400">
+              <a:rPr lang="en-US" sz="1400" dirty="0">
                 <a:latin typeface="Courier New" panose="02070309020205020404" pitchFamily="49" charset="0"/>
                 <a:cs typeface="Courier New" panose="02070309020205020404" pitchFamily="49" charset="0"/>
               </a:rPr>
               <a:t>    "</a:t>
             </a:r>
             <a:r>
-              <a:rPr lang="en-US" sz="1400" err="1">
+              <a:rPr lang="en-US" sz="1400" dirty="0" err="1">
                 <a:latin typeface="Courier New" panose="02070309020205020404" pitchFamily="49" charset="0"/>
                 <a:cs typeface="Courier New" panose="02070309020205020404" pitchFamily="49" charset="0"/>
               </a:rPr>
               <a:t>requestID</a:t>
             </a:r>
             <a:r>
-              <a:rPr lang="en-US" sz="1400">
+              <a:rPr lang="en-US" sz="1400" dirty="0">
                 <a:latin typeface="Courier New" panose="02070309020205020404" pitchFamily="49" charset="0"/>
                 <a:cs typeface="Courier New" panose="02070309020205020404" pitchFamily="49" charset="0"/>
               </a:rPr>
@@ -16032,7 +15869,7 @@
           </a:p>
           <a:p>
             <a:r>
-              <a:rPr lang="en-US" sz="1400">
+              <a:rPr lang="en-US" sz="1400" dirty="0">
                 <a:latin typeface="Courier New" panose="02070309020205020404" pitchFamily="49" charset="0"/>
                 <a:cs typeface="Courier New" panose="02070309020205020404" pitchFamily="49" charset="0"/>
               </a:rPr>
@@ -16041,7 +15878,7 @@
           </a:p>
           <a:p>
             <a:r>
-              <a:rPr lang="en-US" sz="1400">
+              <a:rPr lang="en-US" sz="1400" dirty="0">
                 <a:latin typeface="Courier New" panose="02070309020205020404" pitchFamily="49" charset="0"/>
                 <a:cs typeface="Courier New" panose="02070309020205020404" pitchFamily="49" charset="0"/>
               </a:rPr>
@@ -16050,7 +15887,7 @@
           </a:p>
           <a:p>
             <a:r>
-              <a:rPr lang="en-US" sz="1400">
+              <a:rPr lang="en-US" sz="1400" dirty="0">
                 <a:latin typeface="Courier New" panose="02070309020205020404" pitchFamily="49" charset="0"/>
                 <a:cs typeface="Courier New" panose="02070309020205020404" pitchFamily="49" charset="0"/>
               </a:rPr>
@@ -16059,7 +15896,7 @@
           </a:p>
           <a:p>
             <a:r>
-              <a:rPr lang="en-US" sz="1400">
+              <a:rPr lang="en-US" sz="1400" dirty="0">
                 <a:latin typeface="Courier New" panose="02070309020205020404" pitchFamily="49" charset="0"/>
                 <a:cs typeface="Courier New" panose="02070309020205020404" pitchFamily="49" charset="0"/>
               </a:rPr>
@@ -16068,7 +15905,7 @@
           </a:p>
           <a:p>
             <a:r>
-              <a:rPr lang="en-US" sz="1400">
+              <a:rPr lang="en-US" sz="1400" dirty="0">
                 <a:latin typeface="Courier New" panose="02070309020205020404" pitchFamily="49" charset="0"/>
                 <a:cs typeface="Courier New" panose="02070309020205020404" pitchFamily="49" charset="0"/>
               </a:rPr>
@@ -16077,7 +15914,7 @@
           </a:p>
           <a:p>
             <a:r>
-              <a:rPr lang="en-US" sz="1400">
+              <a:rPr lang="en-US" sz="1400" dirty="0">
                 <a:latin typeface="Courier New" panose="02070309020205020404" pitchFamily="49" charset="0"/>
                 <a:cs typeface="Courier New" panose="02070309020205020404" pitchFamily="49" charset="0"/>
               </a:rPr>

</xml_diff>